<commit_message>
Refactored tempaltes to use devops agent pool module
</commit_message>
<xml_diff>
--- a/docs/wiki/media/src/DevOps Self-Hosted Diagrams.pptx
+++ b/docs/wiki/media/src/DevOps Self-Hosted Diagrams.pptx
@@ -2146,7 +2146,7 @@
           <a:p>
             <a:fld id="{9142FDFA-952F-452D-9530-A8F25C82A8B5}" type="datetimeFigureOut">
               <a:rPr lang="en-US" smtClean="0"/>
-              <a:t>9/13/2024</a:t>
+              <a:t>10/9/2024</a:t>
             </a:fld>
             <a:endParaRPr lang="en-US"/>
           </a:p>
@@ -2344,7 +2344,7 @@
           <a:p>
             <a:fld id="{9142FDFA-952F-452D-9530-A8F25C82A8B5}" type="datetimeFigureOut">
               <a:rPr lang="en-US" smtClean="0"/>
-              <a:t>9/13/2024</a:t>
+              <a:t>10/9/2024</a:t>
             </a:fld>
             <a:endParaRPr lang="en-US"/>
           </a:p>
@@ -2552,7 +2552,7 @@
           <a:p>
             <a:fld id="{9142FDFA-952F-452D-9530-A8F25C82A8B5}" type="datetimeFigureOut">
               <a:rPr lang="en-US" smtClean="0"/>
-              <a:t>9/13/2024</a:t>
+              <a:t>10/9/2024</a:t>
             </a:fld>
             <a:endParaRPr lang="en-US"/>
           </a:p>
@@ -2750,7 +2750,7 @@
           <a:p>
             <a:fld id="{9142FDFA-952F-452D-9530-A8F25C82A8B5}" type="datetimeFigureOut">
               <a:rPr lang="en-US" smtClean="0"/>
-              <a:t>9/13/2024</a:t>
+              <a:t>10/9/2024</a:t>
             </a:fld>
             <a:endParaRPr lang="en-US"/>
           </a:p>
@@ -3025,7 +3025,7 @@
           <a:p>
             <a:fld id="{9142FDFA-952F-452D-9530-A8F25C82A8B5}" type="datetimeFigureOut">
               <a:rPr lang="en-US" smtClean="0"/>
-              <a:t>9/13/2024</a:t>
+              <a:t>10/9/2024</a:t>
             </a:fld>
             <a:endParaRPr lang="en-US"/>
           </a:p>
@@ -3290,7 +3290,7 @@
           <a:p>
             <a:fld id="{9142FDFA-952F-452D-9530-A8F25C82A8B5}" type="datetimeFigureOut">
               <a:rPr lang="en-US" smtClean="0"/>
-              <a:t>9/13/2024</a:t>
+              <a:t>10/9/2024</a:t>
             </a:fld>
             <a:endParaRPr lang="en-US"/>
           </a:p>
@@ -3702,7 +3702,7 @@
           <a:p>
             <a:fld id="{9142FDFA-952F-452D-9530-A8F25C82A8B5}" type="datetimeFigureOut">
               <a:rPr lang="en-US" smtClean="0"/>
-              <a:t>9/13/2024</a:t>
+              <a:t>10/9/2024</a:t>
             </a:fld>
             <a:endParaRPr lang="en-US"/>
           </a:p>
@@ -3843,7 +3843,7 @@
           <a:p>
             <a:fld id="{9142FDFA-952F-452D-9530-A8F25C82A8B5}" type="datetimeFigureOut">
               <a:rPr lang="en-US" smtClean="0"/>
-              <a:t>9/13/2024</a:t>
+              <a:t>10/9/2024</a:t>
             </a:fld>
             <a:endParaRPr lang="en-US"/>
           </a:p>
@@ -3956,7 +3956,7 @@
           <a:p>
             <a:fld id="{9142FDFA-952F-452D-9530-A8F25C82A8B5}" type="datetimeFigureOut">
               <a:rPr lang="en-US" smtClean="0"/>
-              <a:t>9/13/2024</a:t>
+              <a:t>10/9/2024</a:t>
             </a:fld>
             <a:endParaRPr lang="en-US"/>
           </a:p>
@@ -4267,7 +4267,7 @@
           <a:p>
             <a:fld id="{9142FDFA-952F-452D-9530-A8F25C82A8B5}" type="datetimeFigureOut">
               <a:rPr lang="en-US" smtClean="0"/>
-              <a:t>9/13/2024</a:t>
+              <a:t>10/9/2024</a:t>
             </a:fld>
             <a:endParaRPr lang="en-US"/>
           </a:p>
@@ -4555,7 +4555,7 @@
           <a:p>
             <a:fld id="{9142FDFA-952F-452D-9530-A8F25C82A8B5}" type="datetimeFigureOut">
               <a:rPr lang="en-US" smtClean="0"/>
-              <a:t>9/13/2024</a:t>
+              <a:t>10/9/2024</a:t>
             </a:fld>
             <a:endParaRPr lang="en-US"/>
           </a:p>
@@ -4796,7 +4796,7 @@
           <a:p>
             <a:fld id="{9142FDFA-952F-452D-9530-A8F25C82A8B5}" type="datetimeFigureOut">
               <a:rPr lang="en-US" smtClean="0"/>
-              <a:t>9/13/2024</a:t>
+              <a:t>10/9/2024</a:t>
             </a:fld>
             <a:endParaRPr lang="en-US"/>
           </a:p>
@@ -5883,45 +5883,6 @@
           </a:p>
         </p:txBody>
       </p:sp>
-      <p:pic>
-        <p:nvPicPr>
-          <p:cNvPr id="47" name="Graphic 46">
-            <a:extLst>
-              <a:ext uri="{FF2B5EF4-FFF2-40B4-BE49-F238E27FC236}">
-                <a16:creationId xmlns:a16="http://schemas.microsoft.com/office/drawing/2014/main" id="{EB896D7B-CA8A-4535-9A4A-C697FE93B1A6}"/>
-              </a:ext>
-            </a:extLst>
-          </p:cNvPr>
-          <p:cNvPicPr>
-            <a:picLocks noChangeAspect="1"/>
-          </p:cNvPicPr>
-          <p:nvPr/>
-        </p:nvPicPr>
-        <p:blipFill>
-          <a:blip r:embed="rId9">
-            <a:extLst>
-              <a:ext uri="{28A0092B-C50C-407E-A947-70E740481C1C}">
-                <a14:useLocalDpi xmlns:a14="http://schemas.microsoft.com/office/drawing/2010/main" val="0"/>
-              </a:ext>
-              <a:ext uri="{96DAC541-7B7A-43D3-8B79-37D633B846F1}">
-                <asvg:svgBlip xmlns:asvg="http://schemas.microsoft.com/office/drawing/2016/SVG/main" r:embed="rId10"/>
-              </a:ext>
-            </a:extLst>
-          </a:blip>
-          <a:stretch>
-            <a:fillRect/>
-          </a:stretch>
-        </p:blipFill>
-        <p:spPr>
-          <a:xfrm>
-            <a:off x="3263578" y="4678350"/>
-            <a:ext cx="383550" cy="383550"/>
-          </a:xfrm>
-          <a:prstGeom prst="rect">
-            <a:avLst/>
-          </a:prstGeom>
-        </p:spPr>
-      </p:pic>
       <p:sp>
         <p:nvSpPr>
           <p:cNvPr id="48" name="TextBox 47">
@@ -5962,11 +5923,47 @@
                   <a:schemeClr val="bg1"/>
                 </a:solidFill>
               </a:rPr>
-              <a:t>Virtual Machine Scale Set</a:t>
+              <a:t>Managed DevOps Pool</a:t>
             </a:r>
           </a:p>
         </p:txBody>
       </p:sp>
+      <p:pic>
+        <p:nvPicPr>
+          <p:cNvPr id="5" name="Graphic 4">
+            <a:extLst>
+              <a:ext uri="{FF2B5EF4-FFF2-40B4-BE49-F238E27FC236}">
+                <a16:creationId xmlns:a16="http://schemas.microsoft.com/office/drawing/2014/main" id="{E2E30B24-57C7-2C35-FE2B-7B262452A80A}"/>
+              </a:ext>
+            </a:extLst>
+          </p:cNvPr>
+          <p:cNvPicPr>
+            <a:picLocks noChangeAspect="1"/>
+          </p:cNvPicPr>
+          <p:nvPr/>
+        </p:nvPicPr>
+        <p:blipFill>
+          <a:blip r:embed="rId9">
+            <a:extLst>
+              <a:ext uri="{96DAC541-7B7A-43D3-8B79-37D633B846F1}">
+                <asvg:svgBlip xmlns:asvg="http://schemas.microsoft.com/office/drawing/2016/SVG/main" r:embed="rId10"/>
+              </a:ext>
+            </a:extLst>
+          </a:blip>
+          <a:stretch>
+            <a:fillRect/>
+          </a:stretch>
+        </p:blipFill>
+        <p:spPr>
+          <a:xfrm>
+            <a:off x="3244095" y="4683855"/>
+            <a:ext cx="393225" cy="385200"/>
+          </a:xfrm>
+          <a:prstGeom prst="rect">
+            <a:avLst/>
+          </a:prstGeom>
+        </p:spPr>
+      </p:pic>
     </p:spTree>
     <p:extLst>
       <p:ext uri="{BB962C8B-B14F-4D97-AF65-F5344CB8AC3E}">
@@ -5999,10 +5996,10 @@
       </p:grpSpPr>
       <p:sp>
         <p:nvSpPr>
-          <p:cNvPr id="1027" name="Rectangle 1026">
-            <a:extLst>
-              <a:ext uri="{FF2B5EF4-FFF2-40B4-BE49-F238E27FC236}">
-                <a16:creationId xmlns:a16="http://schemas.microsoft.com/office/drawing/2014/main" id="{18AB4F2E-C5B2-831B-7B39-FB94A942B99B}"/>
+          <p:cNvPr id="1024" name="Rectangle 1023">
+            <a:extLst>
+              <a:ext uri="{FF2B5EF4-FFF2-40B4-BE49-F238E27FC236}">
+                <a16:creationId xmlns:a16="http://schemas.microsoft.com/office/drawing/2014/main" id="{2DB600C5-F2C2-FC11-FDAF-FDBDCDEC66D6}"/>
               </a:ext>
             </a:extLst>
           </p:cNvPr>
@@ -6011,8 +6008,8 @@
         </p:nvSpPr>
         <p:spPr>
           <a:xfrm>
-            <a:off x="5700870" y="3003478"/>
-            <a:ext cx="2034000" cy="438999"/>
+            <a:off x="4508526" y="2900941"/>
+            <a:ext cx="2099925" cy="438999"/>
           </a:xfrm>
           <a:prstGeom prst="rect">
             <a:avLst/>
@@ -6061,10 +6058,10 @@
       </p:sp>
       <p:sp>
         <p:nvSpPr>
-          <p:cNvPr id="1025" name="Rectangle 1024">
-            <a:extLst>
-              <a:ext uri="{FF2B5EF4-FFF2-40B4-BE49-F238E27FC236}">
-                <a16:creationId xmlns:a16="http://schemas.microsoft.com/office/drawing/2014/main" id="{8EA6B780-36F7-F8B0-BC2C-596F47190D17}"/>
+          <p:cNvPr id="63" name="Rectangle 62">
+            <a:extLst>
+              <a:ext uri="{FF2B5EF4-FFF2-40B4-BE49-F238E27FC236}">
+                <a16:creationId xmlns:a16="http://schemas.microsoft.com/office/drawing/2014/main" id="{C51BFF49-29D4-60A2-280B-00B222F978A3}"/>
               </a:ext>
             </a:extLst>
           </p:cNvPr>
@@ -6073,8 +6070,8 @@
         </p:nvSpPr>
         <p:spPr>
           <a:xfrm>
-            <a:off x="5661653" y="2970294"/>
-            <a:ext cx="2034000" cy="438999"/>
+            <a:off x="4466918" y="2863290"/>
+            <a:ext cx="2099925" cy="438999"/>
           </a:xfrm>
           <a:prstGeom prst="rect">
             <a:avLst/>
@@ -6123,10 +6120,10 @@
       </p:sp>
       <p:sp>
         <p:nvSpPr>
-          <p:cNvPr id="1024" name="Rectangle 1023">
-            <a:extLst>
-              <a:ext uri="{FF2B5EF4-FFF2-40B4-BE49-F238E27FC236}">
-                <a16:creationId xmlns:a16="http://schemas.microsoft.com/office/drawing/2014/main" id="{2DB600C5-F2C2-FC11-FDAF-FDBDCDEC66D6}"/>
+          <p:cNvPr id="62" name="Rectangle 61">
+            <a:extLst>
+              <a:ext uri="{FF2B5EF4-FFF2-40B4-BE49-F238E27FC236}">
+                <a16:creationId xmlns:a16="http://schemas.microsoft.com/office/drawing/2014/main" id="{47344394-0D66-C7AD-AFA1-F7FAE76A6743}"/>
               </a:ext>
             </a:extLst>
           </p:cNvPr>
@@ -6135,7 +6132,7 @@
         </p:nvSpPr>
         <p:spPr>
           <a:xfrm>
-            <a:off x="3198992" y="3007728"/>
+            <a:off x="4508526" y="4165288"/>
             <a:ext cx="2099925" cy="438999"/>
           </a:xfrm>
           <a:prstGeom prst="rect">
@@ -6185,10 +6182,10 @@
       </p:sp>
       <p:sp>
         <p:nvSpPr>
-          <p:cNvPr id="63" name="Rectangle 62">
-            <a:extLst>
-              <a:ext uri="{FF2B5EF4-FFF2-40B4-BE49-F238E27FC236}">
-                <a16:creationId xmlns:a16="http://schemas.microsoft.com/office/drawing/2014/main" id="{C51BFF49-29D4-60A2-280B-00B222F978A3}"/>
+          <p:cNvPr id="61" name="Rectangle 60">
+            <a:extLst>
+              <a:ext uri="{FF2B5EF4-FFF2-40B4-BE49-F238E27FC236}">
+                <a16:creationId xmlns:a16="http://schemas.microsoft.com/office/drawing/2014/main" id="{EC4F9CBF-6ABC-156C-FBD0-E65C257F4A4F}"/>
               </a:ext>
             </a:extLst>
           </p:cNvPr>
@@ -6197,7 +6194,7 @@
         </p:nvSpPr>
         <p:spPr>
           <a:xfrm>
-            <a:off x="3157384" y="2970077"/>
+            <a:off x="4466919" y="4131324"/>
             <a:ext cx="2099925" cy="438999"/>
           </a:xfrm>
           <a:prstGeom prst="rect">
@@ -6247,10 +6244,10 @@
       </p:sp>
       <p:sp>
         <p:nvSpPr>
-          <p:cNvPr id="62" name="Rectangle 61">
-            <a:extLst>
-              <a:ext uri="{FF2B5EF4-FFF2-40B4-BE49-F238E27FC236}">
-                <a16:creationId xmlns:a16="http://schemas.microsoft.com/office/drawing/2014/main" id="{47344394-0D66-C7AD-AFA1-F7FAE76A6743}"/>
+          <p:cNvPr id="5" name="Rectangle 4">
+            <a:extLst>
+              <a:ext uri="{FF2B5EF4-FFF2-40B4-BE49-F238E27FC236}">
+                <a16:creationId xmlns:a16="http://schemas.microsoft.com/office/drawing/2014/main" id="{6194339B-94A9-0761-EA71-17FDDAB7ACC2}"/>
               </a:ext>
             </a:extLst>
           </p:cNvPr>
@@ -6259,8 +6256,8 @@
         </p:nvSpPr>
         <p:spPr>
           <a:xfrm>
-            <a:off x="3198992" y="4212009"/>
-            <a:ext cx="2099925" cy="438999"/>
+            <a:off x="4451234" y="1643506"/>
+            <a:ext cx="2034372" cy="438999"/>
           </a:xfrm>
           <a:prstGeom prst="rect">
             <a:avLst/>
@@ -6299,20 +6296,83 @@
           <a:bodyPr rtlCol="0" anchor="ctr"/>
           <a:lstStyle/>
           <a:p>
+            <a:r>
+              <a:rPr lang="en-US" sz="1100" i="1" dirty="0">
+                <a:solidFill>
+                  <a:schemeClr val="bg1"/>
+                </a:solidFill>
+              </a:rPr>
+              <a:t>      </a:t>
+            </a:r>
+            <a:r>
+              <a:rPr lang="en-DE" sz="1100" i="1" dirty="0">
+                <a:solidFill>
+                  <a:schemeClr val="bg1"/>
+                </a:solidFill>
+              </a:rPr>
+              <a:t> </a:t>
+            </a:r>
+            <a:r>
+              <a:rPr lang="en-US" sz="1100" i="1" dirty="0">
+                <a:solidFill>
+                  <a:schemeClr val="bg1"/>
+                </a:solidFill>
+              </a:rPr>
+              <a:t> </a:t>
+            </a:r>
+            <a:r>
+              <a:rPr lang="en-US" sz="1100" i="1" dirty="0" err="1">
+                <a:solidFill>
+                  <a:schemeClr val="bg1"/>
+                </a:solidFill>
+              </a:rPr>
+              <a:t>pipeline.yml</a:t>
+            </a:r>
+            <a:r>
+              <a:rPr lang="en-DE" sz="1271" dirty="0">
+                <a:solidFill>
+                  <a:schemeClr val="bg1"/>
+                </a:solidFill>
+              </a:rPr>
+              <a:t> </a:t>
+            </a:r>
             <a:endParaRPr lang="en-US" sz="1271" dirty="0">
               <a:solidFill>
                 <a:schemeClr val="bg1"/>
               </a:solidFill>
             </a:endParaRPr>
           </a:p>
+          <a:p>
+            <a:r>
+              <a:rPr lang="en-US" sz="1271" dirty="0">
+                <a:solidFill>
+                  <a:schemeClr val="bg1"/>
+                </a:solidFill>
+              </a:rPr>
+              <a:t>       Pipeline </a:t>
+            </a:r>
+            <a:r>
+              <a:rPr lang="de-DE" sz="1271" dirty="0">
+                <a:solidFill>
+                  <a:schemeClr val="bg1"/>
+                </a:solidFill>
+              </a:rPr>
+              <a:t>Stage template</a:t>
+            </a:r>
+            <a:endParaRPr lang="en-US" sz="1271" dirty="0">
+              <a:solidFill>
+                <a:schemeClr val="bg1"/>
+              </a:solidFill>
+            </a:endParaRPr>
+          </a:p>
         </p:txBody>
       </p:sp>
       <p:sp>
         <p:nvSpPr>
-          <p:cNvPr id="61" name="Rectangle 60">
-            <a:extLst>
-              <a:ext uri="{FF2B5EF4-FFF2-40B4-BE49-F238E27FC236}">
-                <a16:creationId xmlns:a16="http://schemas.microsoft.com/office/drawing/2014/main" id="{EC4F9CBF-6ABC-156C-FBD0-E65C257F4A4F}"/>
+          <p:cNvPr id="7" name="Rectangle 6">
+            <a:extLst>
+              <a:ext uri="{FF2B5EF4-FFF2-40B4-BE49-F238E27FC236}">
+                <a16:creationId xmlns:a16="http://schemas.microsoft.com/office/drawing/2014/main" id="{42AAB230-4C59-8C5E-2A94-72B3D6B46503}"/>
               </a:ext>
             </a:extLst>
           </p:cNvPr>
@@ -6321,8 +6381,8 @@
         </p:nvSpPr>
         <p:spPr>
           <a:xfrm>
-            <a:off x="3157385" y="4178045"/>
-            <a:ext cx="2099925" cy="438999"/>
+            <a:off x="4451234" y="2233517"/>
+            <a:ext cx="2034372" cy="438999"/>
           </a:xfrm>
           <a:prstGeom prst="rect">
             <a:avLst/>
@@ -6361,6 +6421,61 @@
           <a:bodyPr rtlCol="0" anchor="ctr"/>
           <a:lstStyle/>
           <a:p>
+            <a:r>
+              <a:rPr lang="en-US" sz="1100" i="1" dirty="0">
+                <a:solidFill>
+                  <a:schemeClr val="bg1"/>
+                </a:solidFill>
+              </a:rPr>
+              <a:t>      </a:t>
+            </a:r>
+            <a:r>
+              <a:rPr lang="en-DE" sz="1100" i="1" dirty="0">
+                <a:solidFill>
+                  <a:schemeClr val="bg1"/>
+                </a:solidFill>
+              </a:rPr>
+              <a:t> </a:t>
+            </a:r>
+            <a:r>
+              <a:rPr lang="en-US" sz="1100" i="1" dirty="0">
+                <a:solidFill>
+                  <a:schemeClr val="bg1"/>
+                </a:solidFill>
+              </a:rPr>
+              <a:t> </a:t>
+            </a:r>
+            <a:r>
+              <a:rPr lang="en-US" sz="1100" i="1" dirty="0" err="1">
+                <a:solidFill>
+                  <a:schemeClr val="bg1"/>
+                </a:solidFill>
+              </a:rPr>
+              <a:t>pipeline.jobs.yml</a:t>
+            </a:r>
+            <a:endParaRPr lang="en-US" sz="1100" i="1" dirty="0">
+              <a:solidFill>
+                <a:schemeClr val="bg1"/>
+              </a:solidFill>
+            </a:endParaRPr>
+          </a:p>
+          <a:p>
+            <a:r>
+              <a:rPr lang="en-US" sz="1271" dirty="0">
+                <a:solidFill>
+                  <a:schemeClr val="bg1"/>
+                </a:solidFill>
+              </a:rPr>
+              <a:t>       Pipeline </a:t>
+            </a:r>
+            <a:r>
+              <a:rPr lang="de-DE" sz="1271" dirty="0">
+                <a:solidFill>
+                  <a:schemeClr val="bg1"/>
+                </a:solidFill>
+              </a:rPr>
+              <a:t>Jobs template</a:t>
+            </a:r>
             <a:endParaRPr lang="en-US" sz="1271" dirty="0">
               <a:solidFill>
                 <a:schemeClr val="bg1"/>
@@ -6371,10 +6486,10 @@
       </p:sp>
       <p:sp>
         <p:nvSpPr>
-          <p:cNvPr id="5" name="Rectangle 4">
-            <a:extLst>
-              <a:ext uri="{FF2B5EF4-FFF2-40B4-BE49-F238E27FC236}">
-                <a16:creationId xmlns:a16="http://schemas.microsoft.com/office/drawing/2014/main" id="{6194339B-94A9-0761-EA71-17FDDAB7ACC2}"/>
+          <p:cNvPr id="8" name="Rectangle 7">
+            <a:extLst>
+              <a:ext uri="{FF2B5EF4-FFF2-40B4-BE49-F238E27FC236}">
+                <a16:creationId xmlns:a16="http://schemas.microsoft.com/office/drawing/2014/main" id="{5DDE7DCB-283A-7CFB-6A53-535DA5D6DA5C}"/>
               </a:ext>
             </a:extLst>
           </p:cNvPr>
@@ -6383,8 +6498,8 @@
         </p:nvSpPr>
         <p:spPr>
           <a:xfrm>
-            <a:off x="4451234" y="1643506"/>
-            <a:ext cx="2034372" cy="438999"/>
+            <a:off x="4425131" y="2819621"/>
+            <a:ext cx="2099925" cy="438999"/>
           </a:xfrm>
           <a:prstGeom prst="rect">
             <a:avLst/>
@@ -6429,7 +6544,7 @@
                   <a:schemeClr val="bg1"/>
                 </a:solidFill>
               </a:rPr>
-              <a:t>      </a:t>
+              <a:t>     </a:t>
             </a:r>
             <a:r>
               <a:rPr lang="en-DE" sz="1100" i="1" dirty="0">
@@ -6445,7 +6560,7 @@
                   <a:schemeClr val="bg1"/>
                 </a:solidFill>
               </a:rPr>
-              <a:t> </a:t>
+              <a:t>  &lt;env&gt;.</a:t>
             </a:r>
             <a:r>
               <a:rPr lang="en-US" sz="1100" i="1" dirty="0" err="1">
@@ -6453,7 +6568,7 @@
                   <a:schemeClr val="bg1"/>
                 </a:solidFill>
               </a:rPr>
-              <a:t>pipeline.yml</a:t>
+              <a:t>pool.bicep</a:t>
             </a:r>
             <a:r>
               <a:rPr lang="en-DE" sz="1271" dirty="0">
@@ -6463,43 +6578,35 @@
               </a:rPr>
               <a:t> </a:t>
             </a:r>
+            <a:endParaRPr lang="de-DE" sz="1271" dirty="0">
+              <a:solidFill>
+                <a:schemeClr val="bg1"/>
+              </a:solidFill>
+            </a:endParaRPr>
+          </a:p>
+          <a:p>
+            <a:r>
+              <a:rPr lang="de-DE" sz="1271" dirty="0">
+                <a:solidFill>
+                  <a:schemeClr val="bg1"/>
+                </a:solidFill>
+              </a:rPr>
+              <a:t>       Bicep Deployment files</a:t>
+            </a:r>
             <a:endParaRPr lang="en-US" sz="1271" dirty="0">
               <a:solidFill>
                 <a:schemeClr val="bg1"/>
               </a:solidFill>
             </a:endParaRPr>
           </a:p>
-          <a:p>
-            <a:r>
-              <a:rPr lang="en-US" sz="1271" dirty="0">
-                <a:solidFill>
-                  <a:schemeClr val="bg1"/>
-                </a:solidFill>
-              </a:rPr>
-              <a:t>       Pipeline </a:t>
-            </a:r>
-            <a:r>
-              <a:rPr lang="de-DE" sz="1271" dirty="0">
-                <a:solidFill>
-                  <a:schemeClr val="bg1"/>
-                </a:solidFill>
-              </a:rPr>
-              <a:t>Stage template</a:t>
-            </a:r>
-            <a:endParaRPr lang="en-US" sz="1271" dirty="0">
-              <a:solidFill>
-                <a:schemeClr val="bg1"/>
-              </a:solidFill>
-            </a:endParaRPr>
-          </a:p>
         </p:txBody>
       </p:sp>
       <p:sp>
         <p:nvSpPr>
-          <p:cNvPr id="7" name="Rectangle 6">
-            <a:extLst>
-              <a:ext uri="{FF2B5EF4-FFF2-40B4-BE49-F238E27FC236}">
-                <a16:creationId xmlns:a16="http://schemas.microsoft.com/office/drawing/2014/main" id="{42AAB230-4C59-8C5E-2A94-72B3D6B46503}"/>
+          <p:cNvPr id="9" name="Rectangle 8">
+            <a:extLst>
+              <a:ext uri="{FF2B5EF4-FFF2-40B4-BE49-F238E27FC236}">
+                <a16:creationId xmlns:a16="http://schemas.microsoft.com/office/drawing/2014/main" id="{3662D512-14F8-C045-B068-6E2C3E24AD1C}"/>
               </a:ext>
             </a:extLst>
           </p:cNvPr>
@@ -6508,8 +6615,8 @@
         </p:nvSpPr>
         <p:spPr>
           <a:xfrm>
-            <a:off x="4451234" y="2233517"/>
-            <a:ext cx="2034372" cy="438999"/>
+            <a:off x="4425131" y="3472826"/>
+            <a:ext cx="2099925" cy="438999"/>
           </a:xfrm>
           <a:prstGeom prst="rect">
             <a:avLst/>
@@ -6554,7 +6661,15 @@
                   <a:schemeClr val="bg1"/>
                 </a:solidFill>
               </a:rPr>
-              <a:t>      </a:t>
+              <a:t>        </a:t>
+            </a:r>
+            <a:r>
+              <a:rPr lang="en-US" sz="1100" i="1" dirty="0" err="1">
+                <a:solidFill>
+                  <a:schemeClr val="bg1"/>
+                </a:solidFill>
+              </a:rPr>
+              <a:t>pool.deploy.bicep</a:t>
             </a:r>
             <a:r>
               <a:rPr lang="en-DE" sz="1100" i="1" dirty="0">
@@ -6564,44 +6679,20 @@
               </a:rPr>
               <a:t> </a:t>
             </a:r>
-            <a:r>
-              <a:rPr lang="en-US" sz="1100" i="1" dirty="0">
-                <a:solidFill>
-                  <a:schemeClr val="bg1"/>
-                </a:solidFill>
-              </a:rPr>
-              <a:t> </a:t>
-            </a:r>
-            <a:r>
-              <a:rPr lang="en-US" sz="1100" i="1" dirty="0" err="1">
-                <a:solidFill>
-                  <a:schemeClr val="bg1"/>
-                </a:solidFill>
-              </a:rPr>
-              <a:t>pipeline.jobs.yml</a:t>
-            </a:r>
-            <a:endParaRPr lang="en-US" sz="1100" i="1" dirty="0">
+            <a:endParaRPr lang="de-DE" sz="1100" i="1" dirty="0">
               <a:solidFill>
                 <a:schemeClr val="bg1"/>
               </a:solidFill>
             </a:endParaRPr>
           </a:p>
           <a:p>
-            <a:r>
-              <a:rPr lang="en-US" sz="1271" dirty="0">
-                <a:solidFill>
-                  <a:schemeClr val="bg1"/>
-                </a:solidFill>
-              </a:rPr>
-              <a:t>       Pipeline </a:t>
-            </a:r>
             <a:r>
               <a:rPr lang="de-DE" sz="1271" dirty="0">
                 <a:solidFill>
                   <a:schemeClr val="bg1"/>
                 </a:solidFill>
               </a:rPr>
-              <a:t>Jobs template</a:t>
+              <a:t>       Bicep Template file</a:t>
             </a:r>
             <a:endParaRPr lang="en-US" sz="1271" dirty="0">
               <a:solidFill>
@@ -6613,10 +6704,10 @@
       </p:sp>
       <p:sp>
         <p:nvSpPr>
-          <p:cNvPr id="8" name="Rectangle 7">
-            <a:extLst>
-              <a:ext uri="{FF2B5EF4-FFF2-40B4-BE49-F238E27FC236}">
-                <a16:creationId xmlns:a16="http://schemas.microsoft.com/office/drawing/2014/main" id="{5DDE7DCB-283A-7CFB-6A53-535DA5D6DA5C}"/>
+          <p:cNvPr id="10" name="Rectangle 9">
+            <a:extLst>
+              <a:ext uri="{FF2B5EF4-FFF2-40B4-BE49-F238E27FC236}">
+                <a16:creationId xmlns:a16="http://schemas.microsoft.com/office/drawing/2014/main" id="{2122E31B-CBD1-B807-DA4F-E00E3055915F}"/>
               </a:ext>
             </a:extLst>
           </p:cNvPr>
@@ -6625,7 +6716,7 @@
         </p:nvSpPr>
         <p:spPr>
           <a:xfrm>
-            <a:off x="3115597" y="2926408"/>
+            <a:off x="4425131" y="4093673"/>
             <a:ext cx="2099925" cy="438999"/>
           </a:xfrm>
           <a:prstGeom prst="rect">
@@ -6666,36 +6757,12 @@
           <a:lstStyle/>
           <a:p>
             <a:r>
-              <a:rPr lang="en-US" sz="1100" i="1" dirty="0">
+              <a:rPr lang="en-US" sz="1271" dirty="0">
                 <a:solidFill>
                   <a:schemeClr val="bg1"/>
                 </a:solidFill>
               </a:rPr>
               <a:t>     </a:t>
-            </a:r>
-            <a:r>
-              <a:rPr lang="en-DE" sz="1100" i="1" dirty="0">
-                <a:solidFill>
-                  <a:schemeClr val="bg1"/>
-                </a:solidFill>
-              </a:rPr>
-              <a:t> </a:t>
-            </a:r>
-            <a:r>
-              <a:rPr lang="en-US" sz="1100" i="1" dirty="0">
-                <a:solidFill>
-                  <a:schemeClr val="bg1"/>
-                </a:solidFill>
-              </a:rPr>
-              <a:t>  &lt;env&gt;.</a:t>
-            </a:r>
-            <a:r>
-              <a:rPr lang="en-US" sz="1100" i="1" dirty="0" err="1">
-                <a:solidFill>
-                  <a:schemeClr val="bg1"/>
-                </a:solidFill>
-              </a:rPr>
-              <a:t>scaleset.bicep</a:t>
             </a:r>
             <a:r>
               <a:rPr lang="en-DE" sz="1271" dirty="0">
@@ -6705,191 +6772,21 @@
               </a:rPr>
               <a:t> </a:t>
             </a:r>
-            <a:endParaRPr lang="de-DE" sz="1271" dirty="0">
-              <a:solidFill>
-                <a:schemeClr val="bg1"/>
-              </a:solidFill>
-            </a:endParaRPr>
-          </a:p>
-          <a:p>
-            <a:r>
-              <a:rPr lang="de-DE" sz="1271" dirty="0">
-                <a:solidFill>
-                  <a:schemeClr val="bg1"/>
-                </a:solidFill>
-              </a:rPr>
-              <a:t>       Bicep Deployment files</a:t>
-            </a:r>
-            <a:endParaRPr lang="en-US" sz="1271" dirty="0">
-              <a:solidFill>
-                <a:schemeClr val="bg1"/>
-              </a:solidFill>
-            </a:endParaRPr>
-          </a:p>
-        </p:txBody>
-      </p:sp>
-      <p:sp>
-        <p:nvSpPr>
-          <p:cNvPr id="9" name="Rectangle 8">
-            <a:extLst>
-              <a:ext uri="{FF2B5EF4-FFF2-40B4-BE49-F238E27FC236}">
-                <a16:creationId xmlns:a16="http://schemas.microsoft.com/office/drawing/2014/main" id="{3662D512-14F8-C045-B068-6E2C3E24AD1C}"/>
-              </a:ext>
-            </a:extLst>
-          </p:cNvPr>
-          <p:cNvSpPr/>
-          <p:nvPr/>
-        </p:nvSpPr>
-        <p:spPr>
-          <a:xfrm>
-            <a:off x="3115597" y="3519547"/>
-            <a:ext cx="2099925" cy="438999"/>
-          </a:xfrm>
-          <a:prstGeom prst="rect">
-            <a:avLst/>
-          </a:prstGeom>
-          <a:solidFill>
-            <a:schemeClr val="tx2">
-              <a:lumMod val="75000"/>
-            </a:schemeClr>
-          </a:solidFill>
-          <a:ln w="6350">
-            <a:solidFill>
-              <a:schemeClr val="tx1">
-                <a:lumMod val="50000"/>
-                <a:lumOff val="50000"/>
-              </a:schemeClr>
-            </a:solidFill>
-          </a:ln>
-        </p:spPr>
-        <p:style>
-          <a:lnRef idx="2">
-            <a:schemeClr val="accent1">
-              <a:shade val="50000"/>
-            </a:schemeClr>
-          </a:lnRef>
-          <a:fillRef idx="1">
-            <a:schemeClr val="accent1"/>
-          </a:fillRef>
-          <a:effectRef idx="0">
-            <a:schemeClr val="accent1"/>
-          </a:effectRef>
-          <a:fontRef idx="minor">
-            <a:schemeClr val="lt1"/>
-          </a:fontRef>
-        </p:style>
-        <p:txBody>
-          <a:bodyPr rtlCol="0" anchor="ctr"/>
-          <a:lstStyle/>
-          <a:p>
-            <a:r>
-              <a:rPr lang="en-US" sz="1100" i="1" dirty="0">
-                <a:solidFill>
-                  <a:schemeClr val="bg1"/>
-                </a:solidFill>
-              </a:rPr>
-              <a:t>        </a:t>
-            </a:r>
-            <a:r>
-              <a:rPr lang="en-US" sz="1100" i="1" dirty="0" err="1">
-                <a:solidFill>
-                  <a:schemeClr val="bg1"/>
-                </a:solidFill>
-              </a:rPr>
-              <a:t>scaleset.deploy.bicep</a:t>
-            </a:r>
-            <a:r>
-              <a:rPr lang="en-DE" sz="1100" i="1" dirty="0">
+            <a:r>
+              <a:rPr lang="en-US" sz="1271" dirty="0">
                 <a:solidFill>
                   <a:schemeClr val="bg1"/>
                 </a:solidFill>
               </a:rPr>
               <a:t> </a:t>
             </a:r>
-            <a:endParaRPr lang="de-DE" sz="1100" i="1" dirty="0">
-              <a:solidFill>
-                <a:schemeClr val="bg1"/>
-              </a:solidFill>
-            </a:endParaRPr>
-          </a:p>
-          <a:p>
-            <a:r>
-              <a:rPr lang="de-DE" sz="1271" dirty="0">
+            <a:r>
+              <a:rPr lang="en-US" sz="1271" i="1" dirty="0" err="1">
                 <a:solidFill>
                   <a:schemeClr val="bg1"/>
                 </a:solidFill>
               </a:rPr>
-              <a:t>       Bicep Template file</a:t>
-            </a:r>
-            <a:endParaRPr lang="en-US" sz="1271" dirty="0">
-              <a:solidFill>
-                <a:schemeClr val="bg1"/>
-              </a:solidFill>
-            </a:endParaRPr>
-          </a:p>
-        </p:txBody>
-      </p:sp>
-      <p:sp>
-        <p:nvSpPr>
-          <p:cNvPr id="10" name="Rectangle 9">
-            <a:extLst>
-              <a:ext uri="{FF2B5EF4-FFF2-40B4-BE49-F238E27FC236}">
-                <a16:creationId xmlns:a16="http://schemas.microsoft.com/office/drawing/2014/main" id="{2122E31B-CBD1-B807-DA4F-E00E3055915F}"/>
-              </a:ext>
-            </a:extLst>
-          </p:cNvPr>
-          <p:cNvSpPr/>
-          <p:nvPr/>
-        </p:nvSpPr>
-        <p:spPr>
-          <a:xfrm>
-            <a:off x="3115597" y="4140394"/>
-            <a:ext cx="2099925" cy="438999"/>
-          </a:xfrm>
-          <a:prstGeom prst="rect">
-            <a:avLst/>
-          </a:prstGeom>
-          <a:solidFill>
-            <a:schemeClr val="tx2">
-              <a:lumMod val="75000"/>
-            </a:schemeClr>
-          </a:solidFill>
-          <a:ln w="6350">
-            <a:solidFill>
-              <a:schemeClr val="tx1">
-                <a:lumMod val="50000"/>
-                <a:lumOff val="50000"/>
-              </a:schemeClr>
-            </a:solidFill>
-          </a:ln>
-        </p:spPr>
-        <p:style>
-          <a:lnRef idx="2">
-            <a:schemeClr val="accent1">
-              <a:shade val="50000"/>
-            </a:schemeClr>
-          </a:lnRef>
-          <a:fillRef idx="1">
-            <a:schemeClr val="accent1"/>
-          </a:fillRef>
-          <a:effectRef idx="0">
-            <a:schemeClr val="accent1"/>
-          </a:effectRef>
-          <a:fontRef idx="minor">
-            <a:schemeClr val="lt1"/>
-          </a:fontRef>
-        </p:style>
-        <p:txBody>
-          <a:bodyPr rtlCol="0" anchor="ctr"/>
-          <a:lstStyle/>
-          <a:p>
-            <a:r>
-              <a:rPr lang="en-US" sz="1271" dirty="0">
-                <a:solidFill>
-                  <a:schemeClr val="bg1"/>
-                </a:solidFill>
-              </a:rPr>
-              <a:t>     </a:t>
+              <a:t>main.bicep</a:t>
             </a:r>
             <a:r>
               <a:rPr lang="en-DE" sz="1271" dirty="0">
@@ -6899,30 +6796,6 @@
               </a:rPr>
               <a:t> </a:t>
             </a:r>
-            <a:r>
-              <a:rPr lang="en-US" sz="1271" dirty="0">
-                <a:solidFill>
-                  <a:schemeClr val="bg1"/>
-                </a:solidFill>
-              </a:rPr>
-              <a:t> </a:t>
-            </a:r>
-            <a:r>
-              <a:rPr lang="en-US" sz="1271" i="1" dirty="0" err="1">
-                <a:solidFill>
-                  <a:schemeClr val="bg1"/>
-                </a:solidFill>
-              </a:rPr>
-              <a:t>main.bicep</a:t>
-            </a:r>
-            <a:r>
-              <a:rPr lang="en-DE" sz="1271" dirty="0">
-                <a:solidFill>
-                  <a:schemeClr val="bg1"/>
-                </a:solidFill>
-              </a:rPr>
-              <a:t> </a:t>
-            </a:r>
             <a:endParaRPr lang="en-US" sz="1271" dirty="0">
               <a:solidFill>
                 <a:schemeClr val="bg1"/>
@@ -6944,7 +6817,7 @@
                   <a:schemeClr val="bg1"/>
                 </a:solidFill>
               </a:rPr>
-              <a:t>Bicep CARML modules</a:t>
+              <a:t>Bicep AVM modules</a:t>
             </a:r>
             <a:endParaRPr lang="en-US" sz="1271" dirty="0">
               <a:solidFill>
@@ -6954,112 +6827,6 @@
           </a:p>
         </p:txBody>
       </p:sp>
-      <p:sp>
-        <p:nvSpPr>
-          <p:cNvPr id="11" name="Rectangle 10">
-            <a:extLst>
-              <a:ext uri="{FF2B5EF4-FFF2-40B4-BE49-F238E27FC236}">
-                <a16:creationId xmlns:a16="http://schemas.microsoft.com/office/drawing/2014/main" id="{ECEC507C-5614-10B5-26E2-1E363D11EA53}"/>
-              </a:ext>
-            </a:extLst>
-          </p:cNvPr>
-          <p:cNvSpPr/>
-          <p:nvPr/>
-        </p:nvSpPr>
-        <p:spPr>
-          <a:xfrm>
-            <a:off x="5620045" y="2926408"/>
-            <a:ext cx="2034000" cy="438999"/>
-          </a:xfrm>
-          <a:prstGeom prst="rect">
-            <a:avLst/>
-          </a:prstGeom>
-          <a:solidFill>
-            <a:schemeClr val="tx2">
-              <a:lumMod val="75000"/>
-            </a:schemeClr>
-          </a:solidFill>
-          <a:ln w="6350">
-            <a:solidFill>
-              <a:schemeClr val="tx1">
-                <a:lumMod val="50000"/>
-                <a:lumOff val="50000"/>
-              </a:schemeClr>
-            </a:solidFill>
-          </a:ln>
-        </p:spPr>
-        <p:style>
-          <a:lnRef idx="2">
-            <a:schemeClr val="accent1">
-              <a:shade val="50000"/>
-            </a:schemeClr>
-          </a:lnRef>
-          <a:fillRef idx="1">
-            <a:schemeClr val="accent1"/>
-          </a:fillRef>
-          <a:effectRef idx="0">
-            <a:schemeClr val="accent1"/>
-          </a:effectRef>
-          <a:fontRef idx="minor">
-            <a:schemeClr val="lt1"/>
-          </a:fontRef>
-        </p:style>
-        <p:txBody>
-          <a:bodyPr rtlCol="0" anchor="ctr"/>
-          <a:lstStyle/>
-          <a:p>
-            <a:r>
-              <a:rPr lang="de-DE" sz="1271" dirty="0">
-                <a:solidFill>
-                  <a:schemeClr val="bg1"/>
-                </a:solidFill>
-              </a:rPr>
-              <a:t>       PowerShell scripts</a:t>
-            </a:r>
-            <a:endParaRPr lang="en-US" sz="1271" dirty="0">
-              <a:solidFill>
-                <a:schemeClr val="bg1"/>
-              </a:solidFill>
-            </a:endParaRPr>
-          </a:p>
-        </p:txBody>
-      </p:sp>
-      <p:pic>
-        <p:nvPicPr>
-          <p:cNvPr id="13" name="Picture 12" descr="A blue and white square with a symbol&#10;&#10;Description automatically generated">
-            <a:extLst>
-              <a:ext uri="{FF2B5EF4-FFF2-40B4-BE49-F238E27FC236}">
-                <a16:creationId xmlns:a16="http://schemas.microsoft.com/office/drawing/2014/main" id="{50178872-6A1E-350D-B1E6-5C7CB3EEC16A}"/>
-              </a:ext>
-            </a:extLst>
-          </p:cNvPr>
-          <p:cNvPicPr>
-            <a:picLocks noChangeAspect="1"/>
-          </p:cNvPicPr>
-          <p:nvPr/>
-        </p:nvPicPr>
-        <p:blipFill>
-          <a:blip r:embed="rId2">
-            <a:extLst>
-              <a:ext uri="{28A0092B-C50C-407E-A947-70E740481C1C}">
-                <a14:useLocalDpi xmlns:a14="http://schemas.microsoft.com/office/drawing/2010/main" val="0"/>
-              </a:ext>
-            </a:extLst>
-          </a:blip>
-          <a:stretch>
-            <a:fillRect/>
-          </a:stretch>
-        </p:blipFill>
-        <p:spPr>
-          <a:xfrm>
-            <a:off x="5700870" y="3047333"/>
-            <a:ext cx="204883" cy="204883"/>
-          </a:xfrm>
-          <a:prstGeom prst="rect">
-            <a:avLst/>
-          </a:prstGeom>
-        </p:spPr>
-      </p:pic>
       <p:grpSp>
         <p:nvGrpSpPr>
           <p:cNvPr id="17" name="Group 16">
@@ -7074,7 +6841,7 @@
         </p:nvGrpSpPr>
         <p:grpSpPr>
           <a:xfrm>
-            <a:off x="3132000" y="3015102"/>
+            <a:off x="4441534" y="2908315"/>
             <a:ext cx="304801" cy="261610"/>
             <a:chOff x="2509997" y="693359"/>
             <a:chExt cx="476596" cy="409061"/>
@@ -7189,7 +6956,7 @@
         </p:nvGrpSpPr>
         <p:grpSpPr>
           <a:xfrm>
-            <a:off x="3132000" y="3608241"/>
+            <a:off x="4441534" y="3561520"/>
             <a:ext cx="304801" cy="261610"/>
             <a:chOff x="2509997" y="693359"/>
             <a:chExt cx="476596" cy="409061"/>
@@ -7304,7 +7071,7 @@
         </p:nvGrpSpPr>
         <p:grpSpPr>
           <a:xfrm>
-            <a:off x="3132000" y="4229088"/>
+            <a:off x="4441534" y="4182367"/>
             <a:ext cx="304801" cy="261610"/>
             <a:chOff x="2509997" y="693359"/>
             <a:chExt cx="476596" cy="409061"/>
@@ -7494,7 +7261,7 @@
             <p:nvPr/>
           </p:nvPicPr>
           <p:blipFill>
-            <a:blip r:embed="rId3">
+            <a:blip r:embed="rId2">
               <a:duotone>
                 <a:prstClr val="black"/>
                 <a:srgbClr val="D2D2D2">
@@ -7616,7 +7383,7 @@
             <p:nvPr/>
           </p:nvPicPr>
           <p:blipFill>
-            <a:blip r:embed="rId3">
+            <a:blip r:embed="rId2">
               <a:duotone>
                 <a:prstClr val="black"/>
                 <a:srgbClr val="D2D2D2">
@@ -7717,7 +7484,7 @@
         </p:nvCxnSpPr>
         <p:spPr>
           <a:xfrm>
-            <a:off x="4165560" y="3958546"/>
+            <a:off x="5475094" y="3911825"/>
             <a:ext cx="0" cy="181848"/>
           </a:xfrm>
           <a:prstGeom prst="straightConnector1">
@@ -7767,8 +7534,8 @@
         </p:nvCxnSpPr>
         <p:spPr>
           <a:xfrm>
-            <a:off x="4165560" y="3365407"/>
-            <a:ext cx="0" cy="154140"/>
+            <a:off x="5475094" y="3258620"/>
+            <a:ext cx="0" cy="214206"/>
           </a:xfrm>
           <a:prstGeom prst="straightConnector1">
             <a:avLst/>
@@ -7816,335 +7583,9 @@
           <p:nvPr/>
         </p:nvCxnSpPr>
         <p:spPr>
-          <a:xfrm rot="5400000">
-            <a:off x="4690044" y="2148032"/>
-            <a:ext cx="253892" cy="1302860"/>
-          </a:xfrm>
-          <a:prstGeom prst="bentConnector3">
-            <a:avLst>
-              <a:gd name="adj1" fmla="val 50000"/>
-            </a:avLst>
-          </a:prstGeom>
-          <a:ln w="28575">
-            <a:solidFill>
-              <a:schemeClr val="tx2">
-                <a:lumMod val="60000"/>
-                <a:lumOff val="40000"/>
-              </a:schemeClr>
-            </a:solidFill>
-            <a:prstDash val="solid"/>
-            <a:tailEnd type="triangle" w="med" len="sm"/>
-          </a:ln>
-        </p:spPr>
-        <p:style>
-          <a:lnRef idx="1">
-            <a:schemeClr val="accent1"/>
-          </a:lnRef>
-          <a:fillRef idx="0">
-            <a:schemeClr val="accent1"/>
-          </a:fillRef>
-          <a:effectRef idx="0">
-            <a:schemeClr val="accent1"/>
-          </a:effectRef>
-          <a:fontRef idx="minor">
-            <a:schemeClr val="tx1"/>
-          </a:fontRef>
-        </p:style>
-      </p:cxnSp>
-      <p:cxnSp>
-        <p:nvCxnSpPr>
-          <p:cNvPr id="48" name="Straight Arrow Connector 12">
-            <a:extLst>
-              <a:ext uri="{FF2B5EF4-FFF2-40B4-BE49-F238E27FC236}">
-                <a16:creationId xmlns:a16="http://schemas.microsoft.com/office/drawing/2014/main" id="{D0B68F8F-822D-B8F1-BDDE-496B83730603}"/>
-              </a:ext>
-            </a:extLst>
-          </p:cNvPr>
-          <p:cNvCxnSpPr>
-            <a:cxnSpLocks/>
-            <a:stCxn id="7" idx="2"/>
-            <a:endCxn id="11" idx="0"/>
-          </p:cNvCxnSpPr>
-          <p:nvPr/>
-        </p:nvCxnSpPr>
-        <p:spPr>
-          <a:xfrm rot="16200000" flipH="1">
-            <a:off x="5925786" y="2215149"/>
-            <a:ext cx="253892" cy="1168625"/>
-          </a:xfrm>
-          <a:prstGeom prst="bentConnector3">
-            <a:avLst>
-              <a:gd name="adj1" fmla="val 50000"/>
-            </a:avLst>
-          </a:prstGeom>
-          <a:ln w="28575">
-            <a:solidFill>
-              <a:schemeClr val="tx2">
-                <a:lumMod val="60000"/>
-                <a:lumOff val="40000"/>
-              </a:schemeClr>
-            </a:solidFill>
-            <a:prstDash val="solid"/>
-            <a:tailEnd type="triangle" w="med" len="sm"/>
-          </a:ln>
-        </p:spPr>
-        <p:style>
-          <a:lnRef idx="1">
-            <a:schemeClr val="accent1"/>
-          </a:lnRef>
-          <a:fillRef idx="0">
-            <a:schemeClr val="accent1"/>
-          </a:fillRef>
-          <a:effectRef idx="0">
-            <a:schemeClr val="accent1"/>
-          </a:effectRef>
-          <a:fontRef idx="minor">
-            <a:schemeClr val="tx1"/>
-          </a:fontRef>
-        </p:style>
-      </p:cxnSp>
-      <p:sp>
-        <p:nvSpPr>
-          <p:cNvPr id="2" name="Rectangle 1">
-            <a:extLst>
-              <a:ext uri="{FF2B5EF4-FFF2-40B4-BE49-F238E27FC236}">
-                <a16:creationId xmlns:a16="http://schemas.microsoft.com/office/drawing/2014/main" id="{B357C7A1-4694-53D7-6015-67C05D1EF274}"/>
-              </a:ext>
-            </a:extLst>
-          </p:cNvPr>
-          <p:cNvSpPr/>
-          <p:nvPr/>
-        </p:nvSpPr>
-        <p:spPr>
           <a:xfrm>
-            <a:off x="5620045" y="3519547"/>
-            <a:ext cx="2034372" cy="438999"/>
-          </a:xfrm>
-          <a:prstGeom prst="rect">
-            <a:avLst/>
-          </a:prstGeom>
-          <a:solidFill>
-            <a:schemeClr val="tx2">
-              <a:lumMod val="75000"/>
-            </a:schemeClr>
-          </a:solidFill>
-          <a:ln w="6350">
-            <a:solidFill>
-              <a:schemeClr val="tx1">
-                <a:lumMod val="50000"/>
-                <a:lumOff val="50000"/>
-              </a:schemeClr>
-            </a:solidFill>
-          </a:ln>
-        </p:spPr>
-        <p:style>
-          <a:lnRef idx="2">
-            <a:schemeClr val="accent1">
-              <a:shade val="50000"/>
-            </a:schemeClr>
-          </a:lnRef>
-          <a:fillRef idx="1">
-            <a:schemeClr val="accent1"/>
-          </a:fillRef>
-          <a:effectRef idx="0">
-            <a:schemeClr val="accent1"/>
-          </a:effectRef>
-          <a:fontRef idx="minor">
-            <a:schemeClr val="lt1"/>
-          </a:fontRef>
-        </p:style>
-        <p:txBody>
-          <a:bodyPr rtlCol="0" anchor="ctr"/>
-          <a:lstStyle/>
-          <a:p>
-            <a:r>
-              <a:rPr lang="en-US" sz="1100" i="1" dirty="0">
-                <a:solidFill>
-                  <a:schemeClr val="bg1"/>
-                </a:solidFill>
-              </a:rPr>
-              <a:t>      </a:t>
-            </a:r>
-            <a:r>
-              <a:rPr lang="en-DE" sz="1100" i="1" dirty="0">
-                <a:solidFill>
-                  <a:schemeClr val="bg1"/>
-                </a:solidFill>
-              </a:rPr>
-              <a:t> </a:t>
-            </a:r>
-            <a:r>
-              <a:rPr lang="en-US" sz="1100" i="1" dirty="0">
-                <a:solidFill>
-                  <a:schemeClr val="bg1"/>
-                </a:solidFill>
-              </a:rPr>
-              <a:t> &lt;env&gt;.</a:t>
-            </a:r>
-            <a:r>
-              <a:rPr lang="en-US" sz="1100" i="1" dirty="0" err="1">
-                <a:solidFill>
-                  <a:schemeClr val="bg1"/>
-                </a:solidFill>
-              </a:rPr>
-              <a:t>agentpool.config.json</a:t>
-            </a:r>
-            <a:endParaRPr lang="en-US" sz="1271" dirty="0">
-              <a:solidFill>
-                <a:schemeClr val="bg1"/>
-              </a:solidFill>
-            </a:endParaRPr>
-          </a:p>
-          <a:p>
-            <a:r>
-              <a:rPr lang="en-US" sz="1271" dirty="0">
-                <a:solidFill>
-                  <a:schemeClr val="bg1"/>
-                </a:solidFill>
-              </a:rPr>
-              <a:t>       </a:t>
-            </a:r>
-            <a:r>
-              <a:rPr lang="en-US" sz="1271" dirty="0" err="1">
-                <a:solidFill>
-                  <a:schemeClr val="bg1"/>
-                </a:solidFill>
-              </a:rPr>
-              <a:t>AgentPool</a:t>
-            </a:r>
-            <a:r>
-              <a:rPr lang="en-US" sz="1271" dirty="0">
-                <a:solidFill>
-                  <a:schemeClr val="bg1"/>
-                </a:solidFill>
-              </a:rPr>
-              <a:t> Config</a:t>
-            </a:r>
-          </a:p>
-        </p:txBody>
-      </p:sp>
-      <p:sp>
-        <p:nvSpPr>
-          <p:cNvPr id="4" name="Oval 3">
-            <a:extLst>
-              <a:ext uri="{FF2B5EF4-FFF2-40B4-BE49-F238E27FC236}">
-                <a16:creationId xmlns:a16="http://schemas.microsoft.com/office/drawing/2014/main" id="{42421945-B0D9-A60E-432C-FA0A986A81CA}"/>
-              </a:ext>
-            </a:extLst>
-          </p:cNvPr>
-          <p:cNvSpPr/>
-          <p:nvPr/>
-        </p:nvSpPr>
-        <p:spPr>
-          <a:xfrm>
-            <a:off x="5683693" y="3641717"/>
-            <a:ext cx="212652" cy="212652"/>
-          </a:xfrm>
-          <a:prstGeom prst="ellipse">
-            <a:avLst/>
-          </a:prstGeom>
-          <a:solidFill>
-            <a:schemeClr val="bg1"/>
-          </a:solidFill>
-          <a:ln>
-            <a:solidFill>
-              <a:schemeClr val="tx1"/>
-            </a:solidFill>
-          </a:ln>
-        </p:spPr>
-        <p:style>
-          <a:lnRef idx="2">
-            <a:schemeClr val="accent1">
-              <a:shade val="15000"/>
-            </a:schemeClr>
-          </a:lnRef>
-          <a:fillRef idx="1">
-            <a:schemeClr val="accent1"/>
-          </a:fillRef>
-          <a:effectRef idx="0">
-            <a:schemeClr val="accent1"/>
-          </a:effectRef>
-          <a:fontRef idx="minor">
-            <a:schemeClr val="lt1"/>
-          </a:fontRef>
-        </p:style>
-        <p:txBody>
-          <a:bodyPr rtlCol="0" anchor="ctr"/>
-          <a:lstStyle/>
-          <a:p>
-            <a:pPr algn="ctr"/>
-            <a:endParaRPr lang="en-US" sz="600" dirty="0">
-              <a:solidFill>
-                <a:schemeClr val="bg2">
-                  <a:lumMod val="25000"/>
-                </a:schemeClr>
-              </a:solidFill>
-            </a:endParaRPr>
-          </a:p>
-        </p:txBody>
-      </p:sp>
-      <p:sp>
-        <p:nvSpPr>
-          <p:cNvPr id="12" name="TextBox 11">
-            <a:extLst>
-              <a:ext uri="{FF2B5EF4-FFF2-40B4-BE49-F238E27FC236}">
-                <a16:creationId xmlns:a16="http://schemas.microsoft.com/office/drawing/2014/main" id="{59DF5C1C-3796-D1A4-FBFC-0F08FCDEC357}"/>
-              </a:ext>
-            </a:extLst>
-          </p:cNvPr>
-          <p:cNvSpPr txBox="1"/>
-          <p:nvPr/>
-        </p:nvSpPr>
-        <p:spPr>
-          <a:xfrm>
-            <a:off x="5652802" y="3617238"/>
-            <a:ext cx="274434" cy="261610"/>
-          </a:xfrm>
-          <a:prstGeom prst="rect">
-            <a:avLst/>
-          </a:prstGeom>
-          <a:noFill/>
-        </p:spPr>
-        <p:txBody>
-          <a:bodyPr wrap="none" rtlCol="0">
-            <a:spAutoFit/>
-          </a:bodyPr>
-          <a:lstStyle/>
-          <a:p>
-            <a:pPr algn="ctr"/>
-            <a:r>
-              <a:rPr lang="en-US" sz="1100" dirty="0">
-                <a:solidFill>
-                  <a:schemeClr val="bg2">
-                    <a:lumMod val="25000"/>
-                  </a:schemeClr>
-                </a:solidFill>
-              </a:rPr>
-              <a:t>{}</a:t>
-            </a:r>
-          </a:p>
-        </p:txBody>
-      </p:sp>
-      <p:cxnSp>
-        <p:nvCxnSpPr>
-          <p:cNvPr id="14" name="Straight Arrow Connector 12">
-            <a:extLst>
-              <a:ext uri="{FF2B5EF4-FFF2-40B4-BE49-F238E27FC236}">
-                <a16:creationId xmlns:a16="http://schemas.microsoft.com/office/drawing/2014/main" id="{9F838D50-18C0-144C-FB62-BC780EC662D7}"/>
-              </a:ext>
-            </a:extLst>
-          </p:cNvPr>
-          <p:cNvCxnSpPr>
-            <a:cxnSpLocks/>
-            <a:stCxn id="11" idx="2"/>
-            <a:endCxn id="2" idx="0"/>
-          </p:cNvCxnSpPr>
-          <p:nvPr/>
-        </p:nvCxnSpPr>
-        <p:spPr>
-          <a:xfrm>
-            <a:off x="6637045" y="3365407"/>
-            <a:ext cx="186" cy="154140"/>
+            <a:off x="5468420" y="2672516"/>
+            <a:ext cx="6674" cy="147105"/>
           </a:xfrm>
           <a:prstGeom prst="straightConnector1">
             <a:avLst/>
@@ -13146,45 +12587,6 @@
           <a:xfrm>
             <a:off x="8567066" y="2448382"/>
             <a:ext cx="684000" cy="684000"/>
-          </a:xfrm>
-          <a:prstGeom prst="rect">
-            <a:avLst/>
-          </a:prstGeom>
-        </p:spPr>
-      </p:pic>
-      <p:pic>
-        <p:nvPicPr>
-          <p:cNvPr id="13" name="Graphic 12">
-            <a:extLst>
-              <a:ext uri="{FF2B5EF4-FFF2-40B4-BE49-F238E27FC236}">
-                <a16:creationId xmlns:a16="http://schemas.microsoft.com/office/drawing/2014/main" id="{55423B5D-922B-827E-B620-F82F977EF29D}"/>
-              </a:ext>
-            </a:extLst>
-          </p:cNvPr>
-          <p:cNvPicPr>
-            <a:picLocks noChangeAspect="1"/>
-          </p:cNvPicPr>
-          <p:nvPr/>
-        </p:nvPicPr>
-        <p:blipFill>
-          <a:blip r:embed="rId4">
-            <a:extLst>
-              <a:ext uri="{28A0092B-C50C-407E-A947-70E740481C1C}">
-                <a14:useLocalDpi xmlns:a14="http://schemas.microsoft.com/office/drawing/2010/main" val="0"/>
-              </a:ext>
-              <a:ext uri="{96DAC541-7B7A-43D3-8B79-37D633B846F1}">
-                <asvg:svgBlip xmlns:asvg="http://schemas.microsoft.com/office/drawing/2016/SVG/main" r:embed="rId5"/>
-              </a:ext>
-            </a:extLst>
-          </a:blip>
-          <a:stretch>
-            <a:fillRect/>
-          </a:stretch>
-        </p:blipFill>
-        <p:spPr>
-          <a:xfrm>
-            <a:off x="6281840" y="3565503"/>
-            <a:ext cx="1109408" cy="1109408"/>
           </a:xfrm>
           <a:prstGeom prst="rect">
             <a:avLst/>
@@ -13376,13 +12778,13 @@
             <p:nvPr/>
           </p:nvPicPr>
           <p:blipFill>
-            <a:blip r:embed="rId6">
+            <a:blip r:embed="rId4">
               <a:extLst>
                 <a:ext uri="{28A0092B-C50C-407E-A947-70E740481C1C}">
                   <a14:useLocalDpi xmlns:a14="http://schemas.microsoft.com/office/drawing/2010/main" val="0"/>
                 </a:ext>
                 <a:ext uri="{96DAC541-7B7A-43D3-8B79-37D633B846F1}">
-                  <asvg:svgBlip xmlns:asvg="http://schemas.microsoft.com/office/drawing/2016/SVG/main" r:embed="rId7"/>
+                  <asvg:svgBlip xmlns:asvg="http://schemas.microsoft.com/office/drawing/2016/SVG/main" r:embed="rId5"/>
                 </a:ext>
               </a:extLst>
             </a:blip>
@@ -13415,13 +12817,13 @@
             <p:nvPr/>
           </p:nvPicPr>
           <p:blipFill>
-            <a:blip r:embed="rId8">
+            <a:blip r:embed="rId6">
               <a:extLst>
                 <a:ext uri="{28A0092B-C50C-407E-A947-70E740481C1C}">
                   <a14:useLocalDpi xmlns:a14="http://schemas.microsoft.com/office/drawing/2010/main" val="0"/>
                 </a:ext>
                 <a:ext uri="{96DAC541-7B7A-43D3-8B79-37D633B846F1}">
-                  <asvg:svgBlip xmlns:asvg="http://schemas.microsoft.com/office/drawing/2016/SVG/main" r:embed="rId9"/>
+                  <asvg:svgBlip xmlns:asvg="http://schemas.microsoft.com/office/drawing/2016/SVG/main" r:embed="rId7"/>
                 </a:ext>
               </a:extLst>
             </a:blip>
@@ -13510,13 +12912,13 @@
             <p:nvPr/>
           </p:nvPicPr>
           <p:blipFill>
-            <a:blip r:embed="rId10">
+            <a:blip r:embed="rId8">
               <a:extLst>
                 <a:ext uri="{28A0092B-C50C-407E-A947-70E740481C1C}">
                   <a14:useLocalDpi xmlns:a14="http://schemas.microsoft.com/office/drawing/2010/main" val="0"/>
                 </a:ext>
                 <a:ext uri="{96DAC541-7B7A-43D3-8B79-37D633B846F1}">
-                  <asvg:svgBlip xmlns:asvg="http://schemas.microsoft.com/office/drawing/2016/SVG/main" r:embed="rId11"/>
+                  <asvg:svgBlip xmlns:asvg="http://schemas.microsoft.com/office/drawing/2016/SVG/main" r:embed="rId9"/>
                 </a:ext>
               </a:extLst>
             </a:blip>
@@ -13590,7 +12992,6 @@
           <p:cNvCxnSpPr>
             <a:cxnSpLocks/>
             <a:stCxn id="5" idx="1"/>
-            <a:endCxn id="13" idx="0"/>
           </p:cNvCxnSpPr>
           <p:nvPr/>
         </p:nvCxnSpPr>
@@ -13632,7 +13033,6 @@
           </p:cNvPr>
           <p:cNvCxnSpPr>
             <a:cxnSpLocks/>
-            <a:endCxn id="13" idx="1"/>
           </p:cNvCxnSpPr>
           <p:nvPr/>
         </p:nvCxnSpPr>
@@ -13733,13 +13133,13 @@
           <p:nvPr/>
         </p:nvPicPr>
         <p:blipFill>
-          <a:blip r:embed="rId12">
+          <a:blip r:embed="rId10">
             <a:extLst>
               <a:ext uri="{28A0092B-C50C-407E-A947-70E740481C1C}">
                 <a14:useLocalDpi xmlns:a14="http://schemas.microsoft.com/office/drawing/2010/main" val="0"/>
               </a:ext>
               <a:ext uri="{96DAC541-7B7A-43D3-8B79-37D633B846F1}">
-                <asvg:svgBlip xmlns:asvg="http://schemas.microsoft.com/office/drawing/2016/SVG/main" r:embed="rId13"/>
+                <asvg:svgBlip xmlns:asvg="http://schemas.microsoft.com/office/drawing/2016/SVG/main" r:embed="rId11"/>
               </a:ext>
             </a:extLst>
           </a:blip>
@@ -13851,7 +13251,7 @@
             <p:nvPr/>
           </p:nvPicPr>
           <p:blipFill>
-            <a:blip r:embed="rId14">
+            <a:blip r:embed="rId12">
               <a:biLevel thresh="25000"/>
               <a:extLst>
                 <a:ext uri="{28A0092B-C50C-407E-A947-70E740481C1C}">
@@ -13965,13 +13365,13 @@
             <p:nvPr/>
           </p:nvPicPr>
           <p:blipFill>
-            <a:blip r:embed="rId15">
+            <a:blip r:embed="rId13">
               <a:extLst>
                 <a:ext uri="{28A0092B-C50C-407E-A947-70E740481C1C}">
                   <a14:useLocalDpi xmlns:a14="http://schemas.microsoft.com/office/drawing/2010/main" val="0"/>
                 </a:ext>
                 <a:ext uri="{96DAC541-7B7A-43D3-8B79-37D633B846F1}">
-                  <asvg:svgBlip xmlns:asvg="http://schemas.microsoft.com/office/drawing/2016/SVG/main" r:embed="rId16"/>
+                  <asvg:svgBlip xmlns:asvg="http://schemas.microsoft.com/office/drawing/2016/SVG/main" r:embed="rId14"/>
                 </a:ext>
               </a:extLst>
             </a:blip>
@@ -14143,7 +13543,7 @@
                 </a:solidFill>
                 <a:latin typeface="-apple-system"/>
               </a:rPr>
-              <a:t>Azure DevOps Scale Set</a:t>
+              <a:t>Managed DevOps Pool</a:t>
             </a:r>
           </a:p>
           <a:p>
@@ -14436,6 +13836,42 @@
           </a:p>
         </p:txBody>
       </p:sp>
+      <p:pic>
+        <p:nvPicPr>
+          <p:cNvPr id="2" name="Graphic 1">
+            <a:extLst>
+              <a:ext uri="{FF2B5EF4-FFF2-40B4-BE49-F238E27FC236}">
+                <a16:creationId xmlns:a16="http://schemas.microsoft.com/office/drawing/2014/main" id="{1DD30565-C61E-1A54-63CB-AABDDB266096}"/>
+              </a:ext>
+            </a:extLst>
+          </p:cNvPr>
+          <p:cNvPicPr>
+            <a:picLocks noChangeAspect="1"/>
+          </p:cNvPicPr>
+          <p:nvPr/>
+        </p:nvPicPr>
+        <p:blipFill>
+          <a:blip r:embed="rId15">
+            <a:extLst>
+              <a:ext uri="{96DAC541-7B7A-43D3-8B79-37D633B846F1}">
+                <asvg:svgBlip xmlns:asvg="http://schemas.microsoft.com/office/drawing/2016/SVG/main" r:embed="rId16"/>
+              </a:ext>
+            </a:extLst>
+          </a:blip>
+          <a:stretch>
+            <a:fillRect/>
+          </a:stretch>
+        </p:blipFill>
+        <p:spPr>
+          <a:xfrm>
+            <a:off x="6400692" y="3694257"/>
+            <a:ext cx="919180" cy="900421"/>
+          </a:xfrm>
+          <a:prstGeom prst="rect">
+            <a:avLst/>
+          </a:prstGeom>
+        </p:spPr>
+      </p:pic>
     </p:spTree>
     <p:extLst>
       <p:ext uri="{BB962C8B-B14F-4D97-AF65-F5344CB8AC3E}">

</xml_diff>

<commit_message>
Updated the image construct docs
</commit_message>
<xml_diff>
--- a/docs/wiki/media/src/DevOps Self-Hosted Diagrams.pptx
+++ b/docs/wiki/media/src/DevOps Self-Hosted Diagrams.pptx
@@ -2146,7 +2146,7 @@
           <a:p>
             <a:fld id="{9142FDFA-952F-452D-9530-A8F25C82A8B5}" type="datetimeFigureOut">
               <a:rPr lang="en-US" smtClean="0"/>
-              <a:t>10/9/2024</a:t>
+              <a:t>10/10/2024</a:t>
             </a:fld>
             <a:endParaRPr lang="en-US"/>
           </a:p>
@@ -2344,7 +2344,7 @@
           <a:p>
             <a:fld id="{9142FDFA-952F-452D-9530-A8F25C82A8B5}" type="datetimeFigureOut">
               <a:rPr lang="en-US" smtClean="0"/>
-              <a:t>10/9/2024</a:t>
+              <a:t>10/10/2024</a:t>
             </a:fld>
             <a:endParaRPr lang="en-US"/>
           </a:p>
@@ -2552,7 +2552,7 @@
           <a:p>
             <a:fld id="{9142FDFA-952F-452D-9530-A8F25C82A8B5}" type="datetimeFigureOut">
               <a:rPr lang="en-US" smtClean="0"/>
-              <a:t>10/9/2024</a:t>
+              <a:t>10/10/2024</a:t>
             </a:fld>
             <a:endParaRPr lang="en-US"/>
           </a:p>
@@ -2750,7 +2750,7 @@
           <a:p>
             <a:fld id="{9142FDFA-952F-452D-9530-A8F25C82A8B5}" type="datetimeFigureOut">
               <a:rPr lang="en-US" smtClean="0"/>
-              <a:t>10/9/2024</a:t>
+              <a:t>10/10/2024</a:t>
             </a:fld>
             <a:endParaRPr lang="en-US"/>
           </a:p>
@@ -3025,7 +3025,7 @@
           <a:p>
             <a:fld id="{9142FDFA-952F-452D-9530-A8F25C82A8B5}" type="datetimeFigureOut">
               <a:rPr lang="en-US" smtClean="0"/>
-              <a:t>10/9/2024</a:t>
+              <a:t>10/10/2024</a:t>
             </a:fld>
             <a:endParaRPr lang="en-US"/>
           </a:p>
@@ -3290,7 +3290,7 @@
           <a:p>
             <a:fld id="{9142FDFA-952F-452D-9530-A8F25C82A8B5}" type="datetimeFigureOut">
               <a:rPr lang="en-US" smtClean="0"/>
-              <a:t>10/9/2024</a:t>
+              <a:t>10/10/2024</a:t>
             </a:fld>
             <a:endParaRPr lang="en-US"/>
           </a:p>
@@ -3702,7 +3702,7 @@
           <a:p>
             <a:fld id="{9142FDFA-952F-452D-9530-A8F25C82A8B5}" type="datetimeFigureOut">
               <a:rPr lang="en-US" smtClean="0"/>
-              <a:t>10/9/2024</a:t>
+              <a:t>10/10/2024</a:t>
             </a:fld>
             <a:endParaRPr lang="en-US"/>
           </a:p>
@@ -3843,7 +3843,7 @@
           <a:p>
             <a:fld id="{9142FDFA-952F-452D-9530-A8F25C82A8B5}" type="datetimeFigureOut">
               <a:rPr lang="en-US" smtClean="0"/>
-              <a:t>10/9/2024</a:t>
+              <a:t>10/10/2024</a:t>
             </a:fld>
             <a:endParaRPr lang="en-US"/>
           </a:p>
@@ -3956,7 +3956,7 @@
           <a:p>
             <a:fld id="{9142FDFA-952F-452D-9530-A8F25C82A8B5}" type="datetimeFigureOut">
               <a:rPr lang="en-US" smtClean="0"/>
-              <a:t>10/9/2024</a:t>
+              <a:t>10/10/2024</a:t>
             </a:fld>
             <a:endParaRPr lang="en-US"/>
           </a:p>
@@ -4267,7 +4267,7 @@
           <a:p>
             <a:fld id="{9142FDFA-952F-452D-9530-A8F25C82A8B5}" type="datetimeFigureOut">
               <a:rPr lang="en-US" smtClean="0"/>
-              <a:t>10/9/2024</a:t>
+              <a:t>10/10/2024</a:t>
             </a:fld>
             <a:endParaRPr lang="en-US"/>
           </a:p>
@@ -4555,7 +4555,7 @@
           <a:p>
             <a:fld id="{9142FDFA-952F-452D-9530-A8F25C82A8B5}" type="datetimeFigureOut">
               <a:rPr lang="en-US" smtClean="0"/>
-              <a:t>10/9/2024</a:t>
+              <a:t>10/10/2024</a:t>
             </a:fld>
             <a:endParaRPr lang="en-US"/>
           </a:p>
@@ -4796,7 +4796,7 @@
           <a:p>
             <a:fld id="{9142FDFA-952F-452D-9530-A8F25C82A8B5}" type="datetimeFigureOut">
               <a:rPr lang="en-US" smtClean="0"/>
-              <a:t>10/9/2024</a:t>
+              <a:t>10/10/2024</a:t>
             </a:fld>
             <a:endParaRPr lang="en-US"/>
           </a:p>
@@ -11264,7 +11264,7 @@
                   <a:schemeClr val="bg1"/>
                 </a:solidFill>
               </a:rPr>
-              <a:t>Bicep CARML modules</a:t>
+              <a:t>Bicep AVM modules</a:t>
             </a:r>
             <a:endParaRPr lang="en-US" sz="1271" dirty="0">
               <a:solidFill>

</xml_diff>